<commit_message>
folien namen + pdf
</commit_message>
<xml_diff>
--- a/Folien/Zwischenpräsention.pptx
+++ b/Folien/Zwischenpräsention.pptx
@@ -249,7 +249,7 @@
               <a:defRPr sz="1400"/>
             </a:pPr>
             <a:fld id="{19AD9DEB-1287-4276-93B8-A90F7A8ACC98}" type="datetimeFigureOut">
-              <a:t>29.11.2018</a:t>
+              <a:t>01.12.2018</a:t>
             </a:fld>
             <a:endParaRPr lang="de-DE" sz="1300">
               <a:latin typeface="Arial" pitchFamily="18"/>
@@ -511,7 +511,7 @@
           <a:p>
             <a:pPr lvl="0"/>
             <a:fld id="{11659E72-87A1-4CF1-8D01-275DDB4C3C2C}" type="datetimeFigureOut">
-              <a:t>29.11.2018</a:t>
+              <a:t>01.12.2018</a:t>
             </a:fld>
             <a:endParaRPr lang="de-DE"/>
           </a:p>
@@ -2105,13 +2105,13 @@
         <p:spPr/>
         <p:txBody>
           <a:bodyPr>
-            <a:normAutofit/>
+            <a:normAutofit fontScale="92500"/>
           </a:bodyPr>
           <a:lstStyle/>
           <a:p>
             <a:r>
               <a:rPr lang="de-DE" dirty="0"/>
-              <a:t>Hendrik Steidl</a:t>
+              <a:t>Hendrik Steidl, Hannah Mertens, Andy Tran, Lena Verscht</a:t>
             </a:r>
           </a:p>
         </p:txBody>

</xml_diff>